<commit_message>
update speaker notes, tweek css
</commit_message>
<xml_diff>
--- a/building_with_flux.pptx
+++ b/building_with_flux.pptx
@@ -533,6 +533,50 @@
           <a:bodyPr/>
           <a:lstStyle/>
           <a:p>
+            <a:r>
+              <a:rPr lang="en-US" dirty="0" smtClean="0"/>
+              <a:t>From the flux</a:t>
+            </a:r>
+            <a:r>
+              <a:rPr lang="en-US" baseline="0" dirty="0" smtClean="0"/>
+              <a:t> website</a:t>
+            </a:r>
+          </a:p>
+          <a:p>
+            <a:pPr marL="171450" indent="-171450">
+              <a:buFontTx/>
+              <a:buChar char="-"/>
+            </a:pPr>
+            <a:r>
+              <a:rPr lang="en-US" baseline="0" dirty="0" smtClean="0"/>
+              <a:t>Application architecture/pattern, not specific to React</a:t>
+            </a:r>
+          </a:p>
+          <a:p>
+            <a:pPr marL="171450" indent="-171450">
+              <a:buFontTx/>
+              <a:buChar char="-"/>
+            </a:pPr>
+            <a:r>
+              <a:rPr lang="en-US" baseline="0" dirty="0" smtClean="0"/>
+              <a:t>Complements </a:t>
+            </a:r>
+            <a:r>
+              <a:rPr lang="en-US" baseline="0" dirty="0" err="1" smtClean="0"/>
+              <a:t>react’s</a:t>
+            </a:r>
+            <a:r>
+              <a:rPr lang="en-US" baseline="0" dirty="0" smtClean="0"/>
+              <a:t> </a:t>
+            </a:r>
+            <a:r>
+              <a:rPr lang="en-US" baseline="0" dirty="0" err="1" smtClean="0"/>
+              <a:t>composable</a:t>
+            </a:r>
+            <a:r>
+              <a:rPr lang="en-US" baseline="0" dirty="0" smtClean="0"/>
+              <a:t> view</a:t>
+            </a:r>
             <a:endParaRPr lang="en-US" dirty="0"/>
           </a:p>
         </p:txBody>
@@ -554,7 +598,7 @@
           <a:p>
             <a:fld id="{83E66AC5-3682-AF41-80AC-72B5B7C94EB8}" type="slidenum">
               <a:rPr lang="en-US" smtClean="0"/>
-              <a:t>8</a:t>
+              <a:t>6</a:t>
             </a:fld>
             <a:endParaRPr lang="en-US"/>
           </a:p>
@@ -563,7 +607,7 @@
     </p:spTree>
     <p:extLst>
       <p:ext uri="{BB962C8B-B14F-4D97-AF65-F5344CB8AC3E}">
-        <p14:creationId xmlns:p14="http://schemas.microsoft.com/office/powerpoint/2010/main" val="2344601997"/>
+        <p14:creationId xmlns:p14="http://schemas.microsoft.com/office/powerpoint/2010/main" val="926736407"/>
       </p:ext>
     </p:extLst>
   </p:cSld>
@@ -619,17 +663,17 @@
           <a:p>
             <a:r>
               <a:rPr lang="en-US" dirty="0" smtClean="0"/>
-              <a:t>We’ve favored</a:t>
+              <a:t>Data</a:t>
             </a:r>
             <a:r>
               <a:rPr lang="en-US" baseline="0" dirty="0" smtClean="0"/>
-              <a:t> keeping our API requests contained within the store, particularly to assist with cases where an action may or may need need to issue an API request</a:t>
+              <a:t> connections – clicking a folder needs to update the message list</a:t>
             </a:r>
           </a:p>
           <a:p>
             <a:r>
               <a:rPr lang="en-US" baseline="0" dirty="0" smtClean="0"/>
-              <a:t>- example: cached data</a:t>
+              <a:t>	- clicking a message list item needs to update both the message AND the folders view (potentially marking the item as READ)</a:t>
             </a:r>
             <a:endParaRPr lang="en-US" dirty="0"/>
           </a:p>
@@ -652,7 +696,7 @@
           <a:p>
             <a:fld id="{83E66AC5-3682-AF41-80AC-72B5B7C94EB8}" type="slidenum">
               <a:rPr lang="en-US" smtClean="0"/>
-              <a:t>20</a:t>
+              <a:t>18</a:t>
             </a:fld>
             <a:endParaRPr lang="en-US"/>
           </a:p>
@@ -661,7 +705,7 @@
     </p:spTree>
     <p:extLst>
       <p:ext uri="{BB962C8B-B14F-4D97-AF65-F5344CB8AC3E}">
-        <p14:creationId xmlns:p14="http://schemas.microsoft.com/office/powerpoint/2010/main" val="671437774"/>
+        <p14:creationId xmlns:p14="http://schemas.microsoft.com/office/powerpoint/2010/main" val="1954345154"/>
       </p:ext>
     </p:extLst>
   </p:cSld>
@@ -715,14 +759,6 @@
           <a:bodyPr/>
           <a:lstStyle/>
           <a:p>
-            <a:r>
-              <a:rPr lang="en-US" dirty="0" smtClean="0"/>
-              <a:t>Actions represent</a:t>
-            </a:r>
-            <a:r>
-              <a:rPr lang="en-US" baseline="0" dirty="0" smtClean="0"/>
-              <a:t> something that HAS happened (button clicked, message sent, etc.)</a:t>
-            </a:r>
             <a:endParaRPr lang="en-US" dirty="0"/>
           </a:p>
         </p:txBody>
@@ -744,7 +780,7 @@
           <a:p>
             <a:fld id="{83E66AC5-3682-AF41-80AC-72B5B7C94EB8}" type="slidenum">
               <a:rPr lang="en-US" smtClean="0"/>
-              <a:t>22</a:t>
+              <a:t>19</a:t>
             </a:fld>
             <a:endParaRPr lang="en-US"/>
           </a:p>
@@ -753,7 +789,7 @@
     </p:spTree>
     <p:extLst>
       <p:ext uri="{BB962C8B-B14F-4D97-AF65-F5344CB8AC3E}">
-        <p14:creationId xmlns:p14="http://schemas.microsoft.com/office/powerpoint/2010/main" val="4064485410"/>
+        <p14:creationId xmlns:p14="http://schemas.microsoft.com/office/powerpoint/2010/main" val="671437774"/>
       </p:ext>
     </p:extLst>
   </p:cSld>
@@ -809,20 +845,17 @@
           <a:p>
             <a:r>
               <a:rPr lang="en-US" dirty="0" smtClean="0"/>
-              <a:t>For</a:t>
+              <a:t>We’ve favored</a:t>
             </a:r>
             <a:r>
               <a:rPr lang="en-US" baseline="0" dirty="0" smtClean="0"/>
-              <a:t> items that are HTML and CSS, with no interactivity, you probably don’t need a React component</a:t>
-            </a:r>
-          </a:p>
-          <a:p>
-            <a:endParaRPr lang="en-US" baseline="0" dirty="0" smtClean="0"/>
+              <a:t> keeping our API requests contained within the store, particularly to assist with cases where an action may or may need need to issue an API request</a:t>
+            </a:r>
           </a:p>
           <a:p>
             <a:r>
               <a:rPr lang="en-US" baseline="0" dirty="0" smtClean="0"/>
-              <a:t>Exception: HTML + CSS structure is unreasonably large</a:t>
+              <a:t>- example: cached data</a:t>
             </a:r>
             <a:endParaRPr lang="en-US" dirty="0"/>
           </a:p>
@@ -845,7 +878,7 @@
           <a:p>
             <a:fld id="{83E66AC5-3682-AF41-80AC-72B5B7C94EB8}" type="slidenum">
               <a:rPr lang="en-US" smtClean="0"/>
-              <a:t>23</a:t>
+              <a:t>20</a:t>
             </a:fld>
             <a:endParaRPr lang="en-US"/>
           </a:p>
@@ -854,7 +887,7 @@
     </p:spTree>
     <p:extLst>
       <p:ext uri="{BB962C8B-B14F-4D97-AF65-F5344CB8AC3E}">
-        <p14:creationId xmlns:p14="http://schemas.microsoft.com/office/powerpoint/2010/main" val="4064485410"/>
+        <p14:creationId xmlns:p14="http://schemas.microsoft.com/office/powerpoint/2010/main" val="671437774"/>
       </p:ext>
     </p:extLst>
   </p:cSld>
@@ -910,11 +943,11 @@
           <a:p>
             <a:r>
               <a:rPr lang="en-US" dirty="0" smtClean="0"/>
-              <a:t>Stores</a:t>
+              <a:t>Actions represent</a:t>
             </a:r>
             <a:r>
               <a:rPr lang="en-US" baseline="0" dirty="0" smtClean="0"/>
-              <a:t> are singletons – don’t let views just require stores and import own data</a:t>
+              <a:t> something that HAS happened (button clicked, message sent, etc.)</a:t>
             </a:r>
             <a:endParaRPr lang="en-US" dirty="0"/>
           </a:p>
@@ -937,7 +970,7 @@
           <a:p>
             <a:fld id="{83E66AC5-3682-AF41-80AC-72B5B7C94EB8}" type="slidenum">
               <a:rPr lang="en-US" smtClean="0"/>
-              <a:t>24</a:t>
+              <a:t>22</a:t>
             </a:fld>
             <a:endParaRPr lang="en-US"/>
           </a:p>
@@ -946,7 +979,7 @@
     </p:spTree>
     <p:extLst>
       <p:ext uri="{BB962C8B-B14F-4D97-AF65-F5344CB8AC3E}">
-        <p14:creationId xmlns:p14="http://schemas.microsoft.com/office/powerpoint/2010/main" val="1172855394"/>
+        <p14:creationId xmlns:p14="http://schemas.microsoft.com/office/powerpoint/2010/main" val="4064485410"/>
       </p:ext>
     </p:extLst>
   </p:cSld>
@@ -1002,14 +1035,21 @@
           <a:p>
             <a:r>
               <a:rPr lang="en-US" dirty="0" smtClean="0"/>
-              <a:t>Stores can</a:t>
+              <a:t>For</a:t>
             </a:r>
             <a:r>
               <a:rPr lang="en-US" baseline="0" dirty="0" smtClean="0"/>
-              <a:t> hold more than just a model or collection; they can also hold the UI state associate with the UI representations of those models</a:t>
-            </a:r>
-          </a:p>
-          <a:p>
+              <a:t> items that are HTML and CSS, with no interactivity, you probably don’t need a React component</a:t>
+            </a:r>
+          </a:p>
+          <a:p>
+            <a:endParaRPr lang="en-US" baseline="0" dirty="0" smtClean="0"/>
+          </a:p>
+          <a:p>
+            <a:r>
+              <a:rPr lang="en-US" baseline="0" dirty="0" smtClean="0"/>
+              <a:t>Exception: HTML + CSS structure is unreasonably large</a:t>
+            </a:r>
             <a:endParaRPr lang="en-US" dirty="0"/>
           </a:p>
         </p:txBody>
@@ -1031,7 +1071,7 @@
           <a:p>
             <a:fld id="{83E66AC5-3682-AF41-80AC-72B5B7C94EB8}" type="slidenum">
               <a:rPr lang="en-US" smtClean="0"/>
-              <a:t>25</a:t>
+              <a:t>23</a:t>
             </a:fld>
             <a:endParaRPr lang="en-US"/>
           </a:p>
@@ -1040,7 +1080,7 @@
     </p:spTree>
     <p:extLst>
       <p:ext uri="{BB962C8B-B14F-4D97-AF65-F5344CB8AC3E}">
-        <p14:creationId xmlns:p14="http://schemas.microsoft.com/office/powerpoint/2010/main" val="2534161304"/>
+        <p14:creationId xmlns:p14="http://schemas.microsoft.com/office/powerpoint/2010/main" val="4064485410"/>
       </p:ext>
     </p:extLst>
   </p:cSld>
@@ -1096,36 +1136,11 @@
           <a:p>
             <a:r>
               <a:rPr lang="en-US" dirty="0" smtClean="0"/>
-              <a:t>Favor having an</a:t>
+              <a:t>Stores</a:t>
             </a:r>
             <a:r>
               <a:rPr lang="en-US" baseline="0" dirty="0" smtClean="0"/>
-              <a:t> </a:t>
-            </a:r>
-            <a:r>
-              <a:rPr lang="en-US" baseline="0" dirty="0" err="1" smtClean="0"/>
-              <a:t>onChange</a:t>
-            </a:r>
-            <a:r>
-              <a:rPr lang="en-US" baseline="0" dirty="0" smtClean="0"/>
-              <a:t> and an </a:t>
-            </a:r>
-            <a:r>
-              <a:rPr lang="en-US" baseline="0" dirty="0" err="1" smtClean="0"/>
-              <a:t>onError</a:t>
-            </a:r>
-            <a:r>
-              <a:rPr lang="en-US" baseline="0" dirty="0" smtClean="0"/>
-              <a:t> event callbacks.  </a:t>
-            </a:r>
-          </a:p>
-          <a:p>
-            <a:endParaRPr lang="en-US" baseline="0" dirty="0" smtClean="0"/>
-          </a:p>
-          <a:p>
-            <a:r>
-              <a:rPr lang="en-US" baseline="0" dirty="0" smtClean="0"/>
-              <a:t>Always refresh state of ENTIRE component when a change event is fired</a:t>
+              <a:t> are singletons – don’t let views just require stores and import own data</a:t>
             </a:r>
             <a:endParaRPr lang="en-US" dirty="0"/>
           </a:p>
@@ -1148,7 +1163,7 @@
           <a:p>
             <a:fld id="{83E66AC5-3682-AF41-80AC-72B5B7C94EB8}" type="slidenum">
               <a:rPr lang="en-US" smtClean="0"/>
-              <a:t>26</a:t>
+              <a:t>24</a:t>
             </a:fld>
             <a:endParaRPr lang="en-US"/>
           </a:p>
@@ -1157,7 +1172,7 @@
     </p:spTree>
     <p:extLst>
       <p:ext uri="{BB962C8B-B14F-4D97-AF65-F5344CB8AC3E}">
-        <p14:creationId xmlns:p14="http://schemas.microsoft.com/office/powerpoint/2010/main" val="1442695894"/>
+        <p14:creationId xmlns:p14="http://schemas.microsoft.com/office/powerpoint/2010/main" val="1172855394"/>
       </p:ext>
     </p:extLst>
   </p:cSld>
@@ -1213,12 +1228,14 @@
           <a:p>
             <a:r>
               <a:rPr lang="en-US" dirty="0" smtClean="0"/>
-              <a:t>On changes, views</a:t>
+              <a:t>Stores can</a:t>
             </a:r>
             <a:r>
               <a:rPr lang="en-US" baseline="0" dirty="0" smtClean="0"/>
-              <a:t> should ask the store(s) for EVERY piece of data they need, rather than just the specific piece of data they think might have changed.</a:t>
-            </a:r>
+              <a:t> hold more than just a model or collection; they can also hold the UI state associate with the UI representations of those models</a:t>
+            </a:r>
+          </a:p>
+          <a:p>
             <a:endParaRPr lang="en-US" dirty="0"/>
           </a:p>
         </p:txBody>
@@ -1240,7 +1257,7 @@
           <a:p>
             <a:fld id="{83E66AC5-3682-AF41-80AC-72B5B7C94EB8}" type="slidenum">
               <a:rPr lang="en-US" smtClean="0"/>
-              <a:t>27</a:t>
+              <a:t>25</a:t>
             </a:fld>
             <a:endParaRPr lang="en-US"/>
           </a:p>
@@ -1249,7 +1266,7 @@
     </p:spTree>
     <p:extLst>
       <p:ext uri="{BB962C8B-B14F-4D97-AF65-F5344CB8AC3E}">
-        <p14:creationId xmlns:p14="http://schemas.microsoft.com/office/powerpoint/2010/main" val="533763693"/>
+        <p14:creationId xmlns:p14="http://schemas.microsoft.com/office/powerpoint/2010/main" val="2534161304"/>
       </p:ext>
     </p:extLst>
   </p:cSld>
@@ -1305,11 +1322,36 @@
           <a:p>
             <a:r>
               <a:rPr lang="en-US" dirty="0" smtClean="0"/>
-              <a:t>When change</a:t>
+              <a:t>Favor having an</a:t>
             </a:r>
             <a:r>
               <a:rPr lang="en-US" baseline="0" dirty="0" smtClean="0"/>
-              <a:t> events are fired from the stores, reload entire view state</a:t>
+              <a:t> </a:t>
+            </a:r>
+            <a:r>
+              <a:rPr lang="en-US" baseline="0" dirty="0" err="1" smtClean="0"/>
+              <a:t>onChange</a:t>
+            </a:r>
+            <a:r>
+              <a:rPr lang="en-US" baseline="0" dirty="0" smtClean="0"/>
+              <a:t> and an </a:t>
+            </a:r>
+            <a:r>
+              <a:rPr lang="en-US" baseline="0" dirty="0" err="1" smtClean="0"/>
+              <a:t>onError</a:t>
+            </a:r>
+            <a:r>
+              <a:rPr lang="en-US" baseline="0" dirty="0" smtClean="0"/>
+              <a:t> event callbacks.  </a:t>
+            </a:r>
+          </a:p>
+          <a:p>
+            <a:endParaRPr lang="en-US" baseline="0" dirty="0" smtClean="0"/>
+          </a:p>
+          <a:p>
+            <a:r>
+              <a:rPr lang="en-US" baseline="0" dirty="0" smtClean="0"/>
+              <a:t>Always refresh state of ENTIRE component when a change event is fired</a:t>
             </a:r>
             <a:endParaRPr lang="en-US" dirty="0"/>
           </a:p>
@@ -1332,7 +1374,7 @@
           <a:p>
             <a:fld id="{83E66AC5-3682-AF41-80AC-72B5B7C94EB8}" type="slidenum">
               <a:rPr lang="en-US" smtClean="0"/>
-              <a:t>28</a:t>
+              <a:t>26</a:t>
             </a:fld>
             <a:endParaRPr lang="en-US"/>
           </a:p>
@@ -1341,7 +1383,7 @@
     </p:spTree>
     <p:extLst>
       <p:ext uri="{BB962C8B-B14F-4D97-AF65-F5344CB8AC3E}">
-        <p14:creationId xmlns:p14="http://schemas.microsoft.com/office/powerpoint/2010/main" val="2919780171"/>
+        <p14:creationId xmlns:p14="http://schemas.microsoft.com/office/powerpoint/2010/main" val="1442695894"/>
       </p:ext>
     </p:extLst>
   </p:cSld>
@@ -1397,27 +1439,11 @@
           <a:p>
             <a:r>
               <a:rPr lang="en-US" dirty="0" smtClean="0"/>
-              <a:t>When</a:t>
+              <a:t>On changes, views</a:t>
             </a:r>
             <a:r>
               <a:rPr lang="en-US" baseline="0" dirty="0" smtClean="0"/>
-              <a:t> in doubt, favor keeping all application state within a store.  Some exceptions could exist for component-specific state (dialog position on a screen, widget size, etc.).  For more complex interactions (</a:t>
-            </a:r>
-            <a:r>
-              <a:rPr lang="en-US" baseline="0" dirty="0" err="1" smtClean="0"/>
-              <a:t>eg</a:t>
-            </a:r>
-            <a:r>
-              <a:rPr lang="en-US" baseline="0" dirty="0" smtClean="0"/>
-              <a:t>: displaying a loading spinner while saving), consider firing multiple </a:t>
-            </a:r>
-            <a:r>
-              <a:rPr lang="en-US" baseline="0" dirty="0" err="1" smtClean="0"/>
-              <a:t>onChange</a:t>
-            </a:r>
-            <a:r>
-              <a:rPr lang="en-US" baseline="0" dirty="0" smtClean="0"/>
-              <a:t> events from your store.</a:t>
+              <a:t> should ask the store(s) for EVERY piece of data they need, rather than just the specific piece of data they think might have changed.</a:t>
             </a:r>
             <a:endParaRPr lang="en-US" dirty="0"/>
           </a:p>
@@ -1440,7 +1466,7 @@
           <a:p>
             <a:fld id="{83E66AC5-3682-AF41-80AC-72B5B7C94EB8}" type="slidenum">
               <a:rPr lang="en-US" smtClean="0"/>
-              <a:t>29</a:t>
+              <a:t>27</a:t>
             </a:fld>
             <a:endParaRPr lang="en-US"/>
           </a:p>
@@ -1449,7 +1475,99 @@
     </p:spTree>
     <p:extLst>
       <p:ext uri="{BB962C8B-B14F-4D97-AF65-F5344CB8AC3E}">
-        <p14:creationId xmlns:p14="http://schemas.microsoft.com/office/powerpoint/2010/main" val="285946068"/>
+        <p14:creationId xmlns:p14="http://schemas.microsoft.com/office/powerpoint/2010/main" val="533763693"/>
+      </p:ext>
+    </p:extLst>
+  </p:cSld>
+  <p:clrMapOvr>
+    <a:masterClrMapping/>
+  </p:clrMapOvr>
+</p:notes>
+</file>
+
+<file path=ppt/notesSlides/notesSlide19.xml><?xml version="1.0" encoding="utf-8"?>
+<p:notes xmlns:a="http://schemas.openxmlformats.org/drawingml/2006/main" xmlns:r="http://schemas.openxmlformats.org/officeDocument/2006/relationships" xmlns:p="http://schemas.openxmlformats.org/presentationml/2006/main">
+  <p:cSld>
+    <p:spTree>
+      <p:nvGrpSpPr>
+        <p:cNvPr id="1" name=""/>
+        <p:cNvGrpSpPr/>
+        <p:nvPr/>
+      </p:nvGrpSpPr>
+      <p:grpSpPr>
+        <a:xfrm>
+          <a:off x="0" y="0"/>
+          <a:ext cx="0" cy="0"/>
+          <a:chOff x="0" y="0"/>
+          <a:chExt cx="0" cy="0"/>
+        </a:xfrm>
+      </p:grpSpPr>
+      <p:sp>
+        <p:nvSpPr>
+          <p:cNvPr id="2" name="Slide Image Placeholder 1"/>
+          <p:cNvSpPr>
+            <a:spLocks noGrp="1" noRot="1" noChangeAspect="1"/>
+          </p:cNvSpPr>
+          <p:nvPr>
+            <p:ph type="sldImg"/>
+          </p:nvPr>
+        </p:nvSpPr>
+        <p:spPr/>
+      </p:sp>
+      <p:sp>
+        <p:nvSpPr>
+          <p:cNvPr id="3" name="Notes Placeholder 2"/>
+          <p:cNvSpPr>
+            <a:spLocks noGrp="1"/>
+          </p:cNvSpPr>
+          <p:nvPr>
+            <p:ph type="body" idx="1"/>
+          </p:nvPr>
+        </p:nvSpPr>
+        <p:spPr/>
+        <p:txBody>
+          <a:bodyPr/>
+          <a:lstStyle/>
+          <a:p>
+            <a:r>
+              <a:rPr lang="en-US" dirty="0" smtClean="0"/>
+              <a:t>When change</a:t>
+            </a:r>
+            <a:r>
+              <a:rPr lang="en-US" baseline="0" dirty="0" smtClean="0"/>
+              <a:t> events are fired from the stores, reload entire view state</a:t>
+            </a:r>
+            <a:endParaRPr lang="en-US" dirty="0"/>
+          </a:p>
+        </p:txBody>
+      </p:sp>
+      <p:sp>
+        <p:nvSpPr>
+          <p:cNvPr id="4" name="Slide Number Placeholder 3"/>
+          <p:cNvSpPr>
+            <a:spLocks noGrp="1"/>
+          </p:cNvSpPr>
+          <p:nvPr>
+            <p:ph type="sldNum" sz="quarter" idx="10"/>
+          </p:nvPr>
+        </p:nvSpPr>
+        <p:spPr/>
+        <p:txBody>
+          <a:bodyPr/>
+          <a:lstStyle/>
+          <a:p>
+            <a:fld id="{83E66AC5-3682-AF41-80AC-72B5B7C94EB8}" type="slidenum">
+              <a:rPr lang="en-US" smtClean="0"/>
+              <a:t>28</a:t>
+            </a:fld>
+            <a:endParaRPr lang="en-US"/>
+          </a:p>
+        </p:txBody>
+      </p:sp>
+    </p:spTree>
+    <p:extLst>
+      <p:ext uri="{BB962C8B-B14F-4D97-AF65-F5344CB8AC3E}">
+        <p14:creationId xmlns:p14="http://schemas.microsoft.com/office/powerpoint/2010/main" val="2919780171"/>
       </p:ext>
     </p:extLst>
   </p:cSld>
@@ -1503,6 +1621,20 @@
           <a:bodyPr/>
           <a:lstStyle/>
           <a:p>
+            <a:r>
+              <a:rPr lang="en-US" dirty="0" smtClean="0"/>
+              <a:t>Basic Flux architecture</a:t>
+            </a:r>
+            <a:r>
+              <a:rPr lang="en-US" baseline="0" dirty="0" smtClean="0"/>
+              <a:t> – actions come into the system from either external sources (asynchronous events) or from views</a:t>
+            </a:r>
+          </a:p>
+          <a:p>
+            <a:r>
+              <a:rPr lang="en-US" baseline="0" dirty="0" smtClean="0"/>
+              <a:t>Dispatcher translates actions into events, feeds them into the store, which notifies the views</a:t>
+            </a:r>
             <a:endParaRPr lang="en-US" dirty="0"/>
           </a:p>
         </p:txBody>
@@ -1524,7 +1656,7 @@
           <a:p>
             <a:fld id="{83E66AC5-3682-AF41-80AC-72B5B7C94EB8}" type="slidenum">
               <a:rPr lang="en-US" smtClean="0"/>
-              <a:t>9</a:t>
+              <a:t>7</a:t>
             </a:fld>
             <a:endParaRPr lang="en-US"/>
           </a:p>
@@ -1533,7 +1665,115 @@
     </p:spTree>
     <p:extLst>
       <p:ext uri="{BB962C8B-B14F-4D97-AF65-F5344CB8AC3E}">
-        <p14:creationId xmlns:p14="http://schemas.microsoft.com/office/powerpoint/2010/main" val="959231343"/>
+        <p14:creationId xmlns:p14="http://schemas.microsoft.com/office/powerpoint/2010/main" val="1490178909"/>
+      </p:ext>
+    </p:extLst>
+  </p:cSld>
+  <p:clrMapOvr>
+    <a:masterClrMapping/>
+  </p:clrMapOvr>
+</p:notes>
+</file>
+
+<file path=ppt/notesSlides/notesSlide20.xml><?xml version="1.0" encoding="utf-8"?>
+<p:notes xmlns:a="http://schemas.openxmlformats.org/drawingml/2006/main" xmlns:r="http://schemas.openxmlformats.org/officeDocument/2006/relationships" xmlns:p="http://schemas.openxmlformats.org/presentationml/2006/main">
+  <p:cSld>
+    <p:spTree>
+      <p:nvGrpSpPr>
+        <p:cNvPr id="1" name=""/>
+        <p:cNvGrpSpPr/>
+        <p:nvPr/>
+      </p:nvGrpSpPr>
+      <p:grpSpPr>
+        <a:xfrm>
+          <a:off x="0" y="0"/>
+          <a:ext cx="0" cy="0"/>
+          <a:chOff x="0" y="0"/>
+          <a:chExt cx="0" cy="0"/>
+        </a:xfrm>
+      </p:grpSpPr>
+      <p:sp>
+        <p:nvSpPr>
+          <p:cNvPr id="2" name="Slide Image Placeholder 1"/>
+          <p:cNvSpPr>
+            <a:spLocks noGrp="1" noRot="1" noChangeAspect="1"/>
+          </p:cNvSpPr>
+          <p:nvPr>
+            <p:ph type="sldImg"/>
+          </p:nvPr>
+        </p:nvSpPr>
+        <p:spPr/>
+      </p:sp>
+      <p:sp>
+        <p:nvSpPr>
+          <p:cNvPr id="3" name="Notes Placeholder 2"/>
+          <p:cNvSpPr>
+            <a:spLocks noGrp="1"/>
+          </p:cNvSpPr>
+          <p:nvPr>
+            <p:ph type="body" idx="1"/>
+          </p:nvPr>
+        </p:nvSpPr>
+        <p:spPr/>
+        <p:txBody>
+          <a:bodyPr/>
+          <a:lstStyle/>
+          <a:p>
+            <a:r>
+              <a:rPr lang="en-US" dirty="0" smtClean="0"/>
+              <a:t>When</a:t>
+            </a:r>
+            <a:r>
+              <a:rPr lang="en-US" baseline="0" dirty="0" smtClean="0"/>
+              <a:t> in doubt, favor keeping all application state within a store.  Some exceptions could exist for component-specific state (dialog position on a screen, widget size, etc.).  For more complex interactions (</a:t>
+            </a:r>
+            <a:r>
+              <a:rPr lang="en-US" baseline="0" dirty="0" err="1" smtClean="0"/>
+              <a:t>eg</a:t>
+            </a:r>
+            <a:r>
+              <a:rPr lang="en-US" baseline="0" dirty="0" smtClean="0"/>
+              <a:t>: displaying a loading spinner while saving), consider firing multiple </a:t>
+            </a:r>
+            <a:r>
+              <a:rPr lang="en-US" baseline="0" dirty="0" err="1" smtClean="0"/>
+              <a:t>onChange</a:t>
+            </a:r>
+            <a:r>
+              <a:rPr lang="en-US" baseline="0" dirty="0" smtClean="0"/>
+              <a:t> events from your store.</a:t>
+            </a:r>
+            <a:endParaRPr lang="en-US" dirty="0"/>
+          </a:p>
+        </p:txBody>
+      </p:sp>
+      <p:sp>
+        <p:nvSpPr>
+          <p:cNvPr id="4" name="Slide Number Placeholder 3"/>
+          <p:cNvSpPr>
+            <a:spLocks noGrp="1"/>
+          </p:cNvSpPr>
+          <p:nvPr>
+            <p:ph type="sldNum" sz="quarter" idx="10"/>
+          </p:nvPr>
+        </p:nvSpPr>
+        <p:spPr/>
+        <p:txBody>
+          <a:bodyPr/>
+          <a:lstStyle/>
+          <a:p>
+            <a:fld id="{83E66AC5-3682-AF41-80AC-72B5B7C94EB8}" type="slidenum">
+              <a:rPr lang="en-US" smtClean="0"/>
+              <a:t>29</a:t>
+            </a:fld>
+            <a:endParaRPr lang="en-US"/>
+          </a:p>
+        </p:txBody>
+      </p:sp>
+    </p:spTree>
+    <p:extLst>
+      <p:ext uri="{BB962C8B-B14F-4D97-AF65-F5344CB8AC3E}">
+        <p14:creationId xmlns:p14="http://schemas.microsoft.com/office/powerpoint/2010/main" val="285946068"/>
       </p:ext>
     </p:extLst>
   </p:cSld>
@@ -1587,6 +1827,39 @@
           <a:bodyPr/>
           <a:lstStyle/>
           <a:p>
+            <a:r>
+              <a:rPr lang="en-US" dirty="0" smtClean="0"/>
+              <a:t>Views</a:t>
+            </a:r>
+            <a:r>
+              <a:rPr lang="en-US" baseline="0" dirty="0" smtClean="0"/>
+              <a:t> are </a:t>
+            </a:r>
+            <a:r>
+              <a:rPr lang="en-US" baseline="0" dirty="0" err="1" smtClean="0"/>
+              <a:t>composable</a:t>
+            </a:r>
+            <a:endParaRPr lang="en-US" baseline="0" dirty="0" smtClean="0"/>
+          </a:p>
+          <a:p>
+            <a:pPr marL="171450" indent="-171450">
+              <a:buFontTx/>
+              <a:buChar char="-"/>
+            </a:pPr>
+            <a:r>
+              <a:rPr lang="en-US" baseline="0" dirty="0" smtClean="0"/>
+              <a:t>Easy to write small, isolated views, then pass data down as props to child views</a:t>
+            </a:r>
+          </a:p>
+          <a:p>
+            <a:pPr marL="171450" indent="-171450">
+              <a:buFontTx/>
+              <a:buChar char="-"/>
+            </a:pPr>
+            <a:r>
+              <a:rPr lang="en-US" baseline="0" dirty="0" smtClean="0"/>
+              <a:t>Data shouldn’t need to flow back up</a:t>
+            </a:r>
             <a:endParaRPr lang="en-US" dirty="0"/>
           </a:p>
         </p:txBody>
@@ -1608,7 +1881,7 @@
           <a:p>
             <a:fld id="{83E66AC5-3682-AF41-80AC-72B5B7C94EB8}" type="slidenum">
               <a:rPr lang="en-US" smtClean="0"/>
-              <a:t>10</a:t>
+              <a:t>8</a:t>
             </a:fld>
             <a:endParaRPr lang="en-US"/>
           </a:p>
@@ -1617,7 +1890,7 @@
     </p:spTree>
     <p:extLst>
       <p:ext uri="{BB962C8B-B14F-4D97-AF65-F5344CB8AC3E}">
-        <p14:creationId xmlns:p14="http://schemas.microsoft.com/office/powerpoint/2010/main" val="959231343"/>
+        <p14:creationId xmlns:p14="http://schemas.microsoft.com/office/powerpoint/2010/main" val="2344601997"/>
       </p:ext>
     </p:extLst>
   </p:cSld>
@@ -1673,22 +1946,24 @@
           <a:p>
             <a:r>
               <a:rPr lang="en-US" dirty="0" smtClean="0"/>
-              <a:t>Dispatcher</a:t>
+              <a:t>Stores</a:t>
             </a:r>
             <a:r>
               <a:rPr lang="en-US" baseline="0" dirty="0" smtClean="0"/>
-              <a:t> will send ALL events to the stores that have added callbacks</a:t>
-            </a:r>
-          </a:p>
-          <a:p>
-            <a:endParaRPr lang="en-US" baseline="0" dirty="0" smtClean="0"/>
+              <a:t> hold most of the business logic, along with all application data and state</a:t>
+            </a:r>
           </a:p>
           <a:p>
             <a:r>
               <a:rPr lang="en-US" baseline="0" dirty="0" smtClean="0"/>
-              <a:t>Stores are responsible for looking at the event types and understanding specific events they are interested in</a:t>
-            </a:r>
-            <a:endParaRPr lang="en-US" dirty="0"/>
+              <a:t>Each store deals with a particular problem domain</a:t>
+            </a:r>
+          </a:p>
+          <a:p>
+            <a:r>
+              <a:rPr lang="en-US" baseline="0" dirty="0" smtClean="0"/>
+              <a:t>- </a:t>
+            </a:r>
           </a:p>
         </p:txBody>
       </p:sp>
@@ -1709,7 +1984,7 @@
           <a:p>
             <a:fld id="{83E66AC5-3682-AF41-80AC-72B5B7C94EB8}" type="slidenum">
               <a:rPr lang="en-US" smtClean="0"/>
-              <a:t>11</a:t>
+              <a:t>9</a:t>
             </a:fld>
             <a:endParaRPr lang="en-US"/>
           </a:p>
@@ -1718,7 +1993,7 @@
     </p:spTree>
     <p:extLst>
       <p:ext uri="{BB962C8B-B14F-4D97-AF65-F5344CB8AC3E}">
-        <p14:creationId xmlns:p14="http://schemas.microsoft.com/office/powerpoint/2010/main" val="4131958499"/>
+        <p14:creationId xmlns:p14="http://schemas.microsoft.com/office/powerpoint/2010/main" val="959231343"/>
       </p:ext>
     </p:extLst>
   </p:cSld>
@@ -1774,11 +2049,15 @@
           <a:p>
             <a:r>
               <a:rPr lang="en-US" dirty="0" smtClean="0"/>
-              <a:t>An action creator module</a:t>
+              <a:t>Stores listen for events fired</a:t>
             </a:r>
             <a:r>
               <a:rPr lang="en-US" baseline="0" dirty="0" smtClean="0"/>
-              <a:t> represents an API for creating related actions.</a:t>
+              <a:t> by the dispatcher, filter over the events, and decide what to do with each event </a:t>
+            </a:r>
+            <a:r>
+              <a:rPr lang="en-US" baseline="0" smtClean="0"/>
+              <a:t>coming in</a:t>
             </a:r>
             <a:endParaRPr lang="en-US" dirty="0"/>
           </a:p>
@@ -1801,7 +2080,7 @@
           <a:p>
             <a:fld id="{83E66AC5-3682-AF41-80AC-72B5B7C94EB8}" type="slidenum">
               <a:rPr lang="en-US" smtClean="0"/>
-              <a:t>12</a:t>
+              <a:t>10</a:t>
             </a:fld>
             <a:endParaRPr lang="en-US"/>
           </a:p>
@@ -1810,7 +2089,7 @@
     </p:spTree>
     <p:extLst>
       <p:ext uri="{BB962C8B-B14F-4D97-AF65-F5344CB8AC3E}">
-        <p14:creationId xmlns:p14="http://schemas.microsoft.com/office/powerpoint/2010/main" val="1962509844"/>
+        <p14:creationId xmlns:p14="http://schemas.microsoft.com/office/powerpoint/2010/main" val="959231343"/>
       </p:ext>
     </p:extLst>
   </p:cSld>
@@ -1864,30 +2143,22 @@
           <a:bodyPr/>
           <a:lstStyle/>
           <a:p>
-            <a:pPr marL="0" marR="0" indent="0" algn="l" defTabSz="457200" rtl="0" eaLnBrk="1" fontAlgn="auto" latinLnBrk="0" hangingPunct="1">
-              <a:lnSpc>
-                <a:spcPct val="100000"/>
-              </a:lnSpc>
-              <a:spcBef>
-                <a:spcPts val="0"/>
-              </a:spcBef>
-              <a:spcAft>
-                <a:spcPts val="0"/>
-              </a:spcAft>
-              <a:buClrTx/>
-              <a:buSzTx/>
-              <a:buFontTx/>
-              <a:buNone/>
-              <a:tabLst/>
-              <a:defRPr/>
-            </a:pPr>
             <a:r>
               <a:rPr lang="en-US" dirty="0" smtClean="0"/>
-              <a:t>Pure functions: 1</a:t>
-            </a:r>
-            <a:r>
-              <a:rPr lang="en-US" dirty="0" smtClean="0"/>
-              <a:t>.  The function always evaluates the same result value given the same argument value(s). The function result value cannot depend on any hidden information or state that may change as program execution proceeds or between different executions of the program, nor can it depend on any external input from I/O devices (usually—see below). 2. Evaluation of the result does not cause any semantically observable side effect or output, such as mutation of mutable objects or output to I/O devices (usually—see below).</a:t>
+              <a:t>Dispatcher</a:t>
+            </a:r>
+            <a:r>
+              <a:rPr lang="en-US" baseline="0" dirty="0" smtClean="0"/>
+              <a:t> will send ALL events to the stores that have added callbacks</a:t>
+            </a:r>
+          </a:p>
+          <a:p>
+            <a:endParaRPr lang="en-US" baseline="0" dirty="0" smtClean="0"/>
+          </a:p>
+          <a:p>
+            <a:r>
+              <a:rPr lang="en-US" baseline="0" dirty="0" smtClean="0"/>
+              <a:t>Stores are responsible for looking at the event types and understanding specific events they are interested in</a:t>
             </a:r>
             <a:endParaRPr lang="en-US" dirty="0"/>
           </a:p>
@@ -1910,7 +2181,7 @@
           <a:p>
             <a:fld id="{83E66AC5-3682-AF41-80AC-72B5B7C94EB8}" type="slidenum">
               <a:rPr lang="en-US" smtClean="0"/>
-              <a:t>15</a:t>
+              <a:t>11</a:t>
             </a:fld>
             <a:endParaRPr lang="en-US"/>
           </a:p>
@@ -1919,7 +2190,7 @@
     </p:spTree>
     <p:extLst>
       <p:ext uri="{BB962C8B-B14F-4D97-AF65-F5344CB8AC3E}">
-        <p14:creationId xmlns:p14="http://schemas.microsoft.com/office/powerpoint/2010/main" val="1245156689"/>
+        <p14:creationId xmlns:p14="http://schemas.microsoft.com/office/powerpoint/2010/main" val="4131958499"/>
       </p:ext>
     </p:extLst>
   </p:cSld>
@@ -1975,11 +2246,11 @@
           <a:p>
             <a:r>
               <a:rPr lang="en-US" dirty="0" smtClean="0"/>
-              <a:t>View</a:t>
+              <a:t>An action creator module</a:t>
             </a:r>
             <a:r>
               <a:rPr lang="en-US" baseline="0" dirty="0" smtClean="0"/>
-              <a:t> component hierarchy</a:t>
+              <a:t> represents an API for creating related actions.</a:t>
             </a:r>
             <a:endParaRPr lang="en-US" dirty="0"/>
           </a:p>
@@ -2002,7 +2273,7 @@
           <a:p>
             <a:fld id="{83E66AC5-3682-AF41-80AC-72B5B7C94EB8}" type="slidenum">
               <a:rPr lang="en-US" smtClean="0"/>
-              <a:t>17</a:t>
+              <a:t>12</a:t>
             </a:fld>
             <a:endParaRPr lang="en-US"/>
           </a:p>
@@ -2011,7 +2282,7 @@
     </p:spTree>
     <p:extLst>
       <p:ext uri="{BB962C8B-B14F-4D97-AF65-F5344CB8AC3E}">
-        <p14:creationId xmlns:p14="http://schemas.microsoft.com/office/powerpoint/2010/main" val="2127928393"/>
+        <p14:creationId xmlns:p14="http://schemas.microsoft.com/office/powerpoint/2010/main" val="1962509844"/>
       </p:ext>
     </p:extLst>
   </p:cSld>
@@ -2065,19 +2336,30 @@
           <a:bodyPr/>
           <a:lstStyle/>
           <a:p>
+            <a:pPr marL="0" marR="0" indent="0" algn="l" defTabSz="457200" rtl="0" eaLnBrk="1" fontAlgn="auto" latinLnBrk="0" hangingPunct="1">
+              <a:lnSpc>
+                <a:spcPct val="100000"/>
+              </a:lnSpc>
+              <a:spcBef>
+                <a:spcPts val="0"/>
+              </a:spcBef>
+              <a:spcAft>
+                <a:spcPts val="0"/>
+              </a:spcAft>
+              <a:buClrTx/>
+              <a:buSzTx/>
+              <a:buFontTx/>
+              <a:buNone/>
+              <a:tabLst/>
+              <a:defRPr/>
+            </a:pPr>
             <a:r>
               <a:rPr lang="en-US" dirty="0" smtClean="0"/>
-              <a:t>Data</a:t>
-            </a:r>
-            <a:r>
-              <a:rPr lang="en-US" baseline="0" dirty="0" smtClean="0"/>
-              <a:t> connections – clicking a folder needs to update the message list</a:t>
-            </a:r>
-          </a:p>
-          <a:p>
-            <a:r>
-              <a:rPr lang="en-US" baseline="0" dirty="0" smtClean="0"/>
-              <a:t>	- clicking a message list item needs to update both the message AND the folders view (potentially marking the item as READ)</a:t>
+              <a:t>Pure functions: 1</a:t>
+            </a:r>
+            <a:r>
+              <a:rPr lang="en-US" dirty="0" smtClean="0"/>
+              <a:t>.  The function always evaluates the same result value given the same argument value(s). The function result value cannot depend on any hidden information or state that may change as program execution proceeds or between different executions of the program, nor can it depend on any external input from I/O devices (usually—see below). 2. Evaluation of the result does not cause any semantically observable side effect or output, such as mutation of mutable objects or output to I/O devices (usually—see below).</a:t>
             </a:r>
             <a:endParaRPr lang="en-US" dirty="0"/>
           </a:p>
@@ -2100,7 +2382,7 @@
           <a:p>
             <a:fld id="{83E66AC5-3682-AF41-80AC-72B5B7C94EB8}" type="slidenum">
               <a:rPr lang="en-US" smtClean="0"/>
-              <a:t>18</a:t>
+              <a:t>15</a:t>
             </a:fld>
             <a:endParaRPr lang="en-US"/>
           </a:p>
@@ -2109,7 +2391,7 @@
     </p:spTree>
     <p:extLst>
       <p:ext uri="{BB962C8B-B14F-4D97-AF65-F5344CB8AC3E}">
-        <p14:creationId xmlns:p14="http://schemas.microsoft.com/office/powerpoint/2010/main" val="1954345154"/>
+        <p14:creationId xmlns:p14="http://schemas.microsoft.com/office/powerpoint/2010/main" val="1245156689"/>
       </p:ext>
     </p:extLst>
   </p:cSld>
@@ -2163,6 +2445,14 @@
           <a:bodyPr/>
           <a:lstStyle/>
           <a:p>
+            <a:r>
+              <a:rPr lang="en-US" dirty="0" smtClean="0"/>
+              <a:t>View</a:t>
+            </a:r>
+            <a:r>
+              <a:rPr lang="en-US" baseline="0" dirty="0" smtClean="0"/>
+              <a:t> component hierarchy</a:t>
+            </a:r>
             <a:endParaRPr lang="en-US" dirty="0"/>
           </a:p>
         </p:txBody>
@@ -2184,7 +2474,7 @@
           <a:p>
             <a:fld id="{83E66AC5-3682-AF41-80AC-72B5B7C94EB8}" type="slidenum">
               <a:rPr lang="en-US" smtClean="0"/>
-              <a:t>19</a:t>
+              <a:t>17</a:t>
             </a:fld>
             <a:endParaRPr lang="en-US"/>
           </a:p>
@@ -2193,7 +2483,7 @@
     </p:spTree>
     <p:extLst>
       <p:ext uri="{BB962C8B-B14F-4D97-AF65-F5344CB8AC3E}">
-        <p14:creationId xmlns:p14="http://schemas.microsoft.com/office/powerpoint/2010/main" val="671437774"/>
+        <p14:creationId xmlns:p14="http://schemas.microsoft.com/office/powerpoint/2010/main" val="2127928393"/>
       </p:ext>
     </p:extLst>
   </p:cSld>

</xml_diff>